<commit_message>
Add new features to the project
</commit_message>
<xml_diff>
--- a/scripts/includes/theme_code_blocks.pptx
+++ b/scripts/includes/theme_code_blocks.pptx
@@ -220,7 +220,7 @@
           <a:p>
             <a:fld id="{728AA843-2E0F-4143-82E9-3671A2E63393}" type="datetimeFigureOut">
               <a:rPr lang="en-CA" smtClean="0"/>
-              <a:t>2023-11-03</a:t>
+              <a:t>2023-11-04</a:t>
             </a:fld>
             <a:endParaRPr lang="en-CA"/>
           </a:p>
@@ -464,7 +464,7 @@
           <a:p>
             <a:fld id="{D220F1D1-6C19-4F4B-92BA-F04860C94A09}" type="datetimeFigureOut">
               <a:rPr lang="en-CA" smtClean="0"/>
-              <a:t>2023-11-03</a:t>
+              <a:t>2023-11-04</a:t>
             </a:fld>
             <a:endParaRPr lang="en-CA"/>
           </a:p>
@@ -664,7 +664,7 @@
           <a:p>
             <a:fld id="{D220F1D1-6C19-4F4B-92BA-F04860C94A09}" type="datetimeFigureOut">
               <a:rPr lang="en-CA" smtClean="0"/>
-              <a:t>2023-11-03</a:t>
+              <a:t>2023-11-04</a:t>
             </a:fld>
             <a:endParaRPr lang="en-CA"/>
           </a:p>
@@ -874,7 +874,7 @@
           <a:p>
             <a:fld id="{D220F1D1-6C19-4F4B-92BA-F04860C94A09}" type="datetimeFigureOut">
               <a:rPr lang="en-CA" smtClean="0"/>
-              <a:t>2023-11-03</a:t>
+              <a:t>2023-11-04</a:t>
             </a:fld>
             <a:endParaRPr lang="en-CA"/>
           </a:p>
@@ -1019,19 +1019,24 @@
             <a:normAutofit/>
           </a:bodyPr>
           <a:lstStyle>
-            <a:lvl1pPr>
+            <a:lvl1pPr marL="0" indent="0">
+              <a:buNone/>
               <a:defRPr sz="1200"/>
             </a:lvl1pPr>
-            <a:lvl2pPr>
+            <a:lvl2pPr marL="457200" indent="0">
+              <a:buNone/>
               <a:defRPr sz="1200"/>
             </a:lvl2pPr>
-            <a:lvl3pPr>
+            <a:lvl3pPr marL="914400" indent="0">
+              <a:buNone/>
               <a:defRPr sz="1200"/>
             </a:lvl3pPr>
-            <a:lvl4pPr>
+            <a:lvl4pPr marL="1371600" indent="0">
+              <a:buNone/>
               <a:defRPr sz="1200"/>
             </a:lvl4pPr>
-            <a:lvl5pPr>
+            <a:lvl5pPr marL="1828800" indent="0">
+              <a:buNone/>
               <a:defRPr sz="1200"/>
             </a:lvl5pPr>
           </a:lstStyle>
@@ -1096,7 +1101,7 @@
           <a:p>
             <a:fld id="{D220F1D1-6C19-4F4B-92BA-F04860C94A09}" type="datetimeFigureOut">
               <a:rPr lang="en-CA" smtClean="0"/>
-              <a:t>2023-11-03</a:t>
+              <a:t>2023-11-04</a:t>
             </a:fld>
             <a:endParaRPr lang="en-CA"/>
           </a:p>
@@ -1372,7 +1377,7 @@
           <a:p>
             <a:fld id="{D220F1D1-6C19-4F4B-92BA-F04860C94A09}" type="datetimeFigureOut">
               <a:rPr lang="en-CA" smtClean="0"/>
-              <a:t>2023-11-03</a:t>
+              <a:t>2023-11-04</a:t>
             </a:fld>
             <a:endParaRPr lang="en-CA"/>
           </a:p>
@@ -1446,7 +1451,7 @@
 </file>
 
 <file path=ppt/slideLayouts/slideLayout4.xml><?xml version="1.0" encoding="utf-8"?>
-<p:sldLayout xmlns:a="http://schemas.openxmlformats.org/drawingml/2006/main" xmlns:r="http://schemas.openxmlformats.org/officeDocument/2006/relationships" xmlns:p="http://schemas.openxmlformats.org/presentationml/2006/main" type="twoObj" preserve="1">
+<p:sldLayout xmlns:a="http://schemas.openxmlformats.org/drawingml/2006/main" xmlns:r="http://schemas.openxmlformats.org/officeDocument/2006/relationships" xmlns:p="http://schemas.openxmlformats.org/presentationml/2006/main" preserve="1" userDrawn="1">
   <p:cSld name="Two Content">
     <p:spTree>
       <p:nvGrpSpPr>
@@ -1556,69 +1561,6 @@
       </p:sp>
       <p:sp>
         <p:nvSpPr>
-          <p:cNvPr id="4" name="Content Placeholder 3">
-            <a:extLst>
-              <a:ext uri="{FF2B5EF4-FFF2-40B4-BE49-F238E27FC236}">
-                <a16:creationId xmlns:a16="http://schemas.microsoft.com/office/drawing/2014/main" id="{23C002F1-32E9-2EB4-0CE2-18A2EEAFCF31}"/>
-              </a:ext>
-            </a:extLst>
-          </p:cNvPr>
-          <p:cNvSpPr>
-            <a:spLocks noGrp="1"/>
-          </p:cNvSpPr>
-          <p:nvPr>
-            <p:ph sz="half" idx="2"/>
-          </p:nvPr>
-        </p:nvSpPr>
-        <p:spPr>
-          <a:xfrm>
-            <a:off x="6172200" y="1825625"/>
-            <a:ext cx="5181600" cy="4351338"/>
-          </a:xfrm>
-        </p:spPr>
-        <p:txBody>
-          <a:bodyPr/>
-          <a:lstStyle/>
-          <a:p>
-            <a:pPr lvl="0"/>
-            <a:r>
-              <a:rPr lang="en-US"/>
-              <a:t>Click to edit Master text styles</a:t>
-            </a:r>
-          </a:p>
-          <a:p>
-            <a:pPr lvl="1"/>
-            <a:r>
-              <a:rPr lang="en-US"/>
-              <a:t>Second level</a:t>
-            </a:r>
-          </a:p>
-          <a:p>
-            <a:pPr lvl="2"/>
-            <a:r>
-              <a:rPr lang="en-US"/>
-              <a:t>Third level</a:t>
-            </a:r>
-          </a:p>
-          <a:p>
-            <a:pPr lvl="3"/>
-            <a:r>
-              <a:rPr lang="en-US"/>
-              <a:t>Fourth level</a:t>
-            </a:r>
-          </a:p>
-          <a:p>
-            <a:pPr lvl="4"/>
-            <a:r>
-              <a:rPr lang="en-US"/>
-              <a:t>Fifth level</a:t>
-            </a:r>
-            <a:endParaRPr lang="en-CA"/>
-          </a:p>
-        </p:txBody>
-      </p:sp>
-      <p:sp>
-        <p:nvSpPr>
           <p:cNvPr id="5" name="Date Placeholder 4">
             <a:extLst>
               <a:ext uri="{FF2B5EF4-FFF2-40B4-BE49-F238E27FC236}">
@@ -1640,7 +1582,7 @@
           <a:p>
             <a:fld id="{D220F1D1-6C19-4F4B-92BA-F04860C94A09}" type="datetimeFigureOut">
               <a:rPr lang="en-CA" smtClean="0"/>
-              <a:t>2023-11-03</a:t>
+              <a:t>2023-11-04</a:t>
             </a:fld>
             <a:endParaRPr lang="en-CA"/>
           </a:p>
@@ -1697,6 +1639,95 @@
               <a:t>‹#›</a:t>
             </a:fld>
             <a:endParaRPr lang="en-CA"/>
+          </a:p>
+        </p:txBody>
+      </p:sp>
+      <p:sp>
+        <p:nvSpPr>
+          <p:cNvPr id="8" name="Content Placeholder 2">
+            <a:extLst>
+              <a:ext uri="{FF2B5EF4-FFF2-40B4-BE49-F238E27FC236}">
+                <a16:creationId xmlns:a16="http://schemas.microsoft.com/office/drawing/2014/main" id="{099C00DD-39E3-2E95-797B-843BBD6554B8}"/>
+              </a:ext>
+            </a:extLst>
+          </p:cNvPr>
+          <p:cNvSpPr>
+            <a:spLocks noGrp="1"/>
+          </p:cNvSpPr>
+          <p:nvPr>
+            <p:ph idx="13"/>
+          </p:nvPr>
+        </p:nvSpPr>
+        <p:spPr>
+          <a:xfrm>
+            <a:off x="6172199" y="1819275"/>
+            <a:ext cx="5181601" cy="4351338"/>
+          </a:xfrm>
+          <a:solidFill>
+            <a:srgbClr val="303030"/>
+          </a:solidFill>
+        </p:spPr>
+        <p:txBody>
+          <a:bodyPr>
+            <a:normAutofit/>
+          </a:bodyPr>
+          <a:lstStyle>
+            <a:lvl1pPr marL="0" indent="0">
+              <a:buNone/>
+              <a:defRPr sz="800"/>
+            </a:lvl1pPr>
+            <a:lvl2pPr marL="457200" indent="0">
+              <a:buNone/>
+              <a:defRPr sz="800"/>
+            </a:lvl2pPr>
+            <a:lvl3pPr marL="914400" indent="0">
+              <a:buNone/>
+              <a:defRPr sz="800"/>
+            </a:lvl3pPr>
+            <a:lvl4pPr marL="1371600" indent="0">
+              <a:buNone/>
+              <a:defRPr sz="800"/>
+            </a:lvl4pPr>
+            <a:lvl5pPr marL="1828800" indent="0">
+              <a:buNone/>
+              <a:defRPr sz="800"/>
+            </a:lvl5pPr>
+          </a:lstStyle>
+          <a:p>
+            <a:pPr lvl="0"/>
+            <a:r>
+              <a:rPr lang="en-US" dirty="0"/>
+              <a:t>Click to edit Master text styles</a:t>
+            </a:r>
+          </a:p>
+          <a:p>
+            <a:pPr lvl="1"/>
+            <a:r>
+              <a:rPr lang="en-US" dirty="0"/>
+              <a:t>Second level</a:t>
+            </a:r>
+          </a:p>
+          <a:p>
+            <a:pPr lvl="2"/>
+            <a:r>
+              <a:rPr lang="en-US" dirty="0"/>
+              <a:t>Third level</a:t>
+            </a:r>
+          </a:p>
+          <a:p>
+            <a:pPr lvl="3"/>
+            <a:r>
+              <a:rPr lang="en-US" dirty="0"/>
+              <a:t>Fourth level</a:t>
+            </a:r>
+          </a:p>
+          <a:p>
+            <a:pPr lvl="4"/>
+            <a:r>
+              <a:rPr lang="en-US" dirty="0"/>
+              <a:t>Fifth level</a:t>
+            </a:r>
+            <a:endParaRPr lang="en-CA" dirty="0"/>
           </a:p>
         </p:txBody>
       </p:sp>
@@ -2055,7 +2086,7 @@
           <a:p>
             <a:fld id="{D220F1D1-6C19-4F4B-92BA-F04860C94A09}" type="datetimeFigureOut">
               <a:rPr lang="en-CA" smtClean="0"/>
-              <a:t>2023-11-03</a:t>
+              <a:t>2023-11-04</a:t>
             </a:fld>
             <a:endParaRPr lang="en-CA"/>
           </a:p>
@@ -2197,7 +2228,7 @@
           <a:p>
             <a:fld id="{D220F1D1-6C19-4F4B-92BA-F04860C94A09}" type="datetimeFigureOut">
               <a:rPr lang="en-CA" smtClean="0"/>
-              <a:t>2023-11-03</a:t>
+              <a:t>2023-11-04</a:t>
             </a:fld>
             <a:endParaRPr lang="en-CA"/>
           </a:p>
@@ -2310,7 +2341,7 @@
           <a:p>
             <a:fld id="{D220F1D1-6C19-4F4B-92BA-F04860C94A09}" type="datetimeFigureOut">
               <a:rPr lang="en-CA" smtClean="0"/>
-              <a:t>2023-11-03</a:t>
+              <a:t>2023-11-04</a:t>
             </a:fld>
             <a:endParaRPr lang="en-CA"/>
           </a:p>
@@ -2623,7 +2654,7 @@
           <a:p>
             <a:fld id="{D220F1D1-6C19-4F4B-92BA-F04860C94A09}" type="datetimeFigureOut">
               <a:rPr lang="en-CA" smtClean="0"/>
-              <a:t>2023-11-03</a:t>
+              <a:t>2023-11-04</a:t>
             </a:fld>
             <a:endParaRPr lang="en-CA"/>
           </a:p>
@@ -2912,7 +2943,7 @@
           <a:p>
             <a:fld id="{D220F1D1-6C19-4F4B-92BA-F04860C94A09}" type="datetimeFigureOut">
               <a:rPr lang="en-CA" smtClean="0"/>
-              <a:t>2023-11-03</a:t>
+              <a:t>2023-11-04</a:t>
             </a:fld>
             <a:endParaRPr lang="en-CA"/>
           </a:p>
@@ -3155,7 +3186,7 @@
           <a:p>
             <a:fld id="{D220F1D1-6C19-4F4B-92BA-F04860C94A09}" type="datetimeFigureOut">
               <a:rPr lang="en-CA" smtClean="0"/>
-              <a:t>2023-11-03</a:t>
+              <a:t>2023-11-04</a:t>
             </a:fld>
             <a:endParaRPr lang="en-CA"/>
           </a:p>
@@ -3920,10 +3951,15 @@
             <a:spLocks noGrp="1"/>
           </p:cNvSpPr>
           <p:nvPr>
-            <p:ph sz="half" idx="2"/>
-          </p:nvPr>
-        </p:nvSpPr>
-        <p:spPr/>
+            <p:ph sz="half" idx="4294967295"/>
+          </p:nvPr>
+        </p:nvSpPr>
+        <p:spPr>
+          <a:xfrm>
+            <a:off x="6172200" y="1825625"/>
+            <a:ext cx="5181600" cy="4351338"/>
+          </a:xfrm>
+        </p:spPr>
         <p:txBody>
           <a:bodyPr/>
           <a:lstStyle/>

</xml_diff>

<commit_message>
Improve theme and change slide types
</commit_message>
<xml_diff>
--- a/scripts/includes/theme_code_blocks.pptx
+++ b/scripts/includes/theme_code_blocks.pptx
@@ -989,11 +989,7 @@
             <a:srgbClr val="303030"/>
           </a:solidFill>
           <a:ln w="25400">
-            <a:solidFill>
-              <a:schemeClr val="bg1">
-                <a:lumMod val="50000"/>
-              </a:schemeClr>
-            </a:solidFill>
+            <a:noFill/>
           </a:ln>
         </p:spPr>
         <p:txBody>
@@ -1216,11 +1212,7 @@
             </a:schemeClr>
           </a:solidFill>
           <a:ln w="25400">
-            <a:solidFill>
-              <a:schemeClr val="bg1">
-                <a:lumMod val="50000"/>
-              </a:schemeClr>
-            </a:solidFill>
+            <a:noFill/>
           </a:ln>
         </p:spPr>
         <p:txBody>
@@ -1582,11 +1574,7 @@
             </a:schemeClr>
           </a:solidFill>
           <a:ln w="25400">
-            <a:solidFill>
-              <a:schemeClr val="bg1">
-                <a:lumMod val="50000"/>
-              </a:schemeClr>
-            </a:solidFill>
+            <a:noFill/>
           </a:ln>
         </p:spPr>
         <p:txBody>
@@ -1634,11 +1622,7 @@
             </a:schemeClr>
           </a:solidFill>
           <a:ln w="25400">
-            <a:solidFill>
-              <a:schemeClr val="bg1">
-                <a:lumMod val="50000"/>
-              </a:schemeClr>
-            </a:solidFill>
+            <a:noFill/>
           </a:ln>
         </p:spPr>
         <p:txBody>
@@ -1723,11 +1707,7 @@
             <a:srgbClr val="303030"/>
           </a:solidFill>
           <a:ln w="25400">
-            <a:solidFill>
-              <a:schemeClr val="bg1">
-                <a:lumMod val="50000"/>
-              </a:schemeClr>
-            </a:solidFill>
+            <a:noFill/>
           </a:ln>
         </p:spPr>
         <p:txBody>

</xml_diff>

<commit_message>
Update theme and sample output
</commit_message>
<xml_diff>
--- a/scripts/includes/theme_code_blocks.pptx
+++ b/scripts/includes/theme_code_blocks.pptx
@@ -943,9 +943,12 @@
 <p:sldLayout xmlns:a="http://schemas.openxmlformats.org/drawingml/2006/main" xmlns:r="http://schemas.openxmlformats.org/officeDocument/2006/relationships" xmlns:p="http://schemas.openxmlformats.org/presentationml/2006/main" preserve="1" userDrawn="1">
   <p:cSld name="Title and Content">
     <p:bg>
-      <p:bgRef idx="1001">
-        <a:schemeClr val="bg1"/>
-      </p:bgRef>
+      <p:bgPr>
+        <a:solidFill>
+          <a:schemeClr val="tx1"/>
+        </a:solidFill>
+        <a:effectLst/>
+      </p:bgPr>
     </p:bg>
     <p:spTree>
       <p:nvGrpSpPr>
@@ -1214,7 +1217,11 @@
           </a:bodyPr>
           <a:lstStyle>
             <a:lvl1pPr algn="ctr">
-              <a:defRPr sz="3600"/>
+              <a:defRPr sz="3600">
+                <a:solidFill>
+                  <a:schemeClr val="bg1"/>
+                </a:solidFill>
+              </a:defRPr>
             </a:lvl1pPr>
           </a:lstStyle>
           <a:p>
@@ -1519,9 +1526,12 @@
 <p:sldLayout xmlns:a="http://schemas.openxmlformats.org/drawingml/2006/main" xmlns:r="http://schemas.openxmlformats.org/officeDocument/2006/relationships" xmlns:p="http://schemas.openxmlformats.org/presentationml/2006/main" type="twoObj" preserve="1">
   <p:cSld name="Two Content">
     <p:bg>
-      <p:bgRef idx="1001">
-        <a:schemeClr val="bg1"/>
-      </p:bgRef>
+      <p:bgPr>
+        <a:solidFill>
+          <a:schemeClr val="tx1"/>
+        </a:solidFill>
+        <a:effectLst/>
+      </p:bgPr>
     </p:bg>
     <p:spTree>
       <p:nvGrpSpPr>
@@ -1569,7 +1579,11 @@
           </a:bodyPr>
           <a:lstStyle>
             <a:lvl1pPr algn="l">
-              <a:defRPr sz="3600"/>
+              <a:defRPr sz="3600">
+                <a:solidFill>
+                  <a:schemeClr val="bg1"/>
+                </a:solidFill>
+              </a:defRPr>
             </a:lvl1pPr>
           </a:lstStyle>
           <a:p>
@@ -1611,19 +1625,39 @@
           <a:bodyPr anchor="t"/>
           <a:lstStyle>
             <a:lvl1pPr indent="-156600">
-              <a:defRPr sz="2000"/>
+              <a:defRPr sz="2000">
+                <a:solidFill>
+                  <a:schemeClr val="bg1"/>
+                </a:solidFill>
+              </a:defRPr>
             </a:lvl1pPr>
             <a:lvl2pPr marL="361800" indent="-156600">
-              <a:defRPr sz="1800"/>
+              <a:defRPr sz="1800">
+                <a:solidFill>
+                  <a:schemeClr val="bg1"/>
+                </a:solidFill>
+              </a:defRPr>
             </a:lvl2pPr>
             <a:lvl3pPr marL="540000" indent="-156600">
-              <a:defRPr sz="1600"/>
+              <a:defRPr sz="1600">
+                <a:solidFill>
+                  <a:schemeClr val="bg1"/>
+                </a:solidFill>
+              </a:defRPr>
             </a:lvl3pPr>
             <a:lvl4pPr marL="720000" indent="-156600">
-              <a:defRPr sz="1400"/>
+              <a:defRPr sz="1400">
+                <a:solidFill>
+                  <a:schemeClr val="bg1"/>
+                </a:solidFill>
+              </a:defRPr>
             </a:lvl4pPr>
             <a:lvl5pPr marL="900000" indent="-156600">
-              <a:defRPr sz="1200"/>
+              <a:defRPr sz="1200">
+                <a:solidFill>
+                  <a:schemeClr val="bg1"/>
+                </a:solidFill>
+              </a:defRPr>
             </a:lvl5pPr>
           </a:lstStyle>
           <a:p>

</xml_diff>